<commit_message>
added today's final lecture code.
</commit_message>
<xml_diff>
--- a/lectures/2018-11-08 C++ - More Pointers/pointer questions.pptx
+++ b/lectures/2018-11-08 C++ - More Pointers/pointer questions.pptx
@@ -108,6 +108,11 @@
       </a:defRPr>
     </a:lvl9pPr>
   </p:defaultTextStyle>
+  <p:extLst>
+    <p:ext uri="{EFAFB233-063F-42B5-8137-9DF3F51BA10A}">
+      <p15:sldGuideLst xmlns:p15="http://schemas.microsoft.com/office/powerpoint/2012/main"/>
+    </p:ext>
+  </p:extLst>
 </p:presentation>
 </file>
 
@@ -4273,10 +4278,16 @@
               <a:buNone/>
             </a:pPr>
             <a:r>
+              <a:rPr lang="en-US">
+                <a:latin typeface="Consolas" panose="020B0609020204030204" pitchFamily="49" charset="0"/>
+              </a:rPr>
+              <a:t>z(&amp;a</a:t>
+            </a:r>
+            <a:r>
               <a:rPr lang="en-US" dirty="0">
                 <a:latin typeface="Consolas" panose="020B0609020204030204" pitchFamily="49" charset="0"/>
               </a:rPr>
-              <a:t>z(a, b);</a:t>
+              <a:t>, b);</a:t>
             </a:r>
           </a:p>
           <a:p>
@@ -4287,13 +4298,13 @@
               <a:rPr lang="en-US" dirty="0" err="1">
                 <a:latin typeface="Consolas" panose="020B0609020204030204" pitchFamily="49" charset="0"/>
               </a:rPr>
-              <a:t>cout</a:t>
+              <a:t>Cout</a:t>
             </a:r>
             <a:r>
               <a:rPr lang="en-US" dirty="0">
                 <a:latin typeface="Consolas" panose="020B0609020204030204" pitchFamily="49" charset="0"/>
               </a:rPr>
-              <a:t> a &lt;&lt; " " &lt;&lt; b;</a:t>
+              <a:t> &lt;&lt; a &lt;&lt; " " &lt;&lt; b;</a:t>
             </a:r>
           </a:p>
           <a:p>
@@ -4321,14 +4332,11 @@
               <a:t>addrs</a:t>
             </a:r>
             <a:r>
-              <a:rPr lang="en-US">
+              <a:rPr lang="en-US" dirty="0">
                 <a:latin typeface="Consolas" panose="020B0609020204030204" pitchFamily="49" charset="0"/>
               </a:rPr>
               <a:t>.</a:t>
             </a:r>
-            <a:endParaRPr lang="en-US" dirty="0">
-              <a:latin typeface="Consolas" panose="020B0609020204030204" pitchFamily="49" charset="0"/>
-            </a:endParaRPr>
           </a:p>
         </p:txBody>
       </p:sp>

</xml_diff>